<commit_message>
Proof read changes for the powerpoint
</commit_message>
<xml_diff>
--- a/ContainersT.pptx
+++ b/ContainersT.pptx
@@ -22325,8 +22325,32 @@
                 </a:solidFill>
                 <a:latin typeface="+mn-lt"/>
               </a:rPr>
-              <a:t>Se pueden configurar con aplicaciones y usan un template para su creación (Dockerfile).</a:t>
-            </a:r>
+              <a:t>Se pueden configurar con aplicaciones y usan un template para su creación (Dockerfile</a:t>
+            </a:r>
+            <a:r>
+              <a:rPr lang="en" dirty="0" smtClean="0">
+                <a:solidFill>
+                  <a:schemeClr val="dk2"/>
+                </a:solidFill>
+                <a:latin typeface="+mn-lt"/>
+              </a:rPr>
+              <a:t>).</a:t>
+            </a:r>
+          </a:p>
+          <a:p>
+            <a:pPr lvl="0" algn="just">
+              <a:spcBef>
+                <a:spcPts val="0"/>
+              </a:spcBef>
+              <a:buFont typeface="Arial" panose="020B0604020202020204" pitchFamily="34" charset="0"/>
+              <a:buChar char="•"/>
+            </a:pPr>
+            <a:endParaRPr lang="en" dirty="0">
+              <a:solidFill>
+                <a:schemeClr val="dk2"/>
+              </a:solidFill>
+              <a:latin typeface="+mn-lt"/>
+            </a:endParaRPr>
           </a:p>
           <a:p>
             <a:pPr lvl="0" algn="just">
@@ -22591,6 +22615,14 @@
 <file path=ppt/slides/slide15.xml><?xml version="1.0" encoding="utf-8"?>
 <p:sld xmlns:a="http://schemas.openxmlformats.org/drawingml/2006/main" xmlns:r="http://schemas.openxmlformats.org/officeDocument/2006/relationships" xmlns:p="http://schemas.openxmlformats.org/presentationml/2006/main">
   <p:cSld>
+    <p:bg>
+      <p:bgPr>
+        <a:solidFill>
+          <a:schemeClr val="bg1"/>
+        </a:solidFill>
+        <a:effectLst/>
+      </p:bgPr>
+    </p:bg>
     <p:spTree>
       <p:nvGrpSpPr>
         <p:cNvPr id="1" name=""/>
@@ -22605,56 +22637,6 @@
           <a:chExt cx="0" cy="0"/>
         </a:xfrm>
       </p:grpSpPr>
-      <p:sp>
-        <p:nvSpPr>
-          <p:cNvPr id="3" name="Title 2"/>
-          <p:cNvSpPr>
-            <a:spLocks noGrp="1"/>
-          </p:cNvSpPr>
-          <p:nvPr>
-            <p:ph type="title"/>
-          </p:nvPr>
-        </p:nvSpPr>
-        <p:spPr/>
-        <p:txBody>
-          <a:bodyPr/>
-          <a:lstStyle/>
-          <a:p>
-            <a:r>
-              <a:rPr lang="es-CO" dirty="0" err="1" smtClean="0"/>
-              <a:t>Docker</a:t>
-            </a:r>
-            <a:r>
-              <a:rPr lang="es-CO" dirty="0" smtClean="0"/>
-              <a:t> </a:t>
-            </a:r>
-            <a:r>
-              <a:rPr lang="es-CO" dirty="0" err="1" smtClean="0"/>
-              <a:t>Images</a:t>
-            </a:r>
-            <a:endParaRPr lang="en-US" dirty="0"/>
-          </a:p>
-        </p:txBody>
-      </p:sp>
-      <p:sp>
-        <p:nvSpPr>
-          <p:cNvPr id="4" name="Text Placeholder 3"/>
-          <p:cNvSpPr>
-            <a:spLocks noGrp="1"/>
-          </p:cNvSpPr>
-          <p:nvPr>
-            <p:ph type="body" sz="quarter" idx="11"/>
-          </p:nvPr>
-        </p:nvSpPr>
-        <p:spPr/>
-        <p:txBody>
-          <a:bodyPr/>
-          <a:lstStyle/>
-          <a:p>
-            <a:endParaRPr lang="en-US"/>
-          </a:p>
-        </p:txBody>
-      </p:sp>
       <p:sp>
         <p:nvSpPr>
           <p:cNvPr id="7" name="Shape 224"/>
@@ -22720,21 +22702,13 @@
               <a:buChar char="•"/>
             </a:pPr>
             <a:r>
-              <a:rPr lang="en" dirty="0" smtClean="0">
+              <a:rPr lang="en" dirty="0">
                 <a:solidFill>
                   <a:schemeClr val="dk2"/>
                 </a:solidFill>
                 <a:latin typeface="+mn-lt"/>
               </a:rPr>
-              <a:t>“docker pull </a:t>
-            </a:r>
-            <a:r>
-              <a:rPr lang="en" i="1" dirty="0" smtClean="0">
-                <a:solidFill>
-                  <a:schemeClr val="dk2"/>
-                </a:solidFill>
-              </a:rPr>
-              <a:t>repo:tag</a:t>
+              <a:t>“docker pull repo:tag” descarga la imagen a la </a:t>
             </a:r>
             <a:r>
               <a:rPr lang="en" dirty="0" smtClean="0">
@@ -22743,7 +22717,16 @@
                 </a:solidFill>
                 <a:latin typeface="+mn-lt"/>
               </a:rPr>
-              <a:t>” descarga la imagen a la maquina local.</a:t>
+              <a:t>máquina </a:t>
+            </a:r>
+            <a:r>
+              <a:rPr lang="en" dirty="0">
+                <a:solidFill>
+                  <a:schemeClr val="dk2"/>
+                </a:solidFill>
+                <a:latin typeface="+mn-lt"/>
+              </a:rPr>
+              <a:t>local.</a:t>
             </a:r>
           </a:p>
           <a:p>
@@ -22754,7 +22737,7 @@
               <a:buFont typeface="Arial" panose="020B0604020202020204" pitchFamily="34" charset="0"/>
               <a:buChar char="•"/>
             </a:pPr>
-            <a:endParaRPr lang="en" dirty="0" smtClean="0">
+            <a:endParaRPr lang="en" dirty="0">
               <a:solidFill>
                 <a:schemeClr val="dk2"/>
               </a:solidFill>
@@ -22770,7 +22753,7 @@
               <a:buChar char="•"/>
             </a:pPr>
             <a:r>
-              <a:rPr lang="en" i="1" dirty="0" smtClean="0">
+              <a:rPr lang="en" dirty="0">
                 <a:solidFill>
                   <a:schemeClr val="dk2"/>
                 </a:solidFill>
@@ -22779,7 +22762,7 @@
               <a:t>“</a:t>
             </a:r>
             <a:r>
-              <a:rPr lang="en-US" i="1" dirty="0" err="1">
+              <a:rPr lang="en-US" dirty="0" err="1">
                 <a:solidFill>
                   <a:schemeClr val="dk2"/>
                 </a:solidFill>
@@ -22788,7 +22771,7 @@
               <a:t>docker</a:t>
             </a:r>
             <a:r>
-              <a:rPr lang="en-US" i="1" dirty="0">
+              <a:rPr lang="en-US" dirty="0">
                 <a:solidFill>
                   <a:schemeClr val="dk2"/>
                 </a:solidFill>
@@ -22797,7 +22780,7 @@
               <a:t> </a:t>
             </a:r>
             <a:r>
-              <a:rPr lang="en-US" i="1" dirty="0" smtClean="0">
+              <a:rPr lang="en-US" dirty="0">
                 <a:solidFill>
                   <a:schemeClr val="dk2"/>
                 </a:solidFill>
@@ -22806,7 +22789,7 @@
               <a:t>images” </a:t>
             </a:r>
             <a:r>
-              <a:rPr lang="en-US" i="1" dirty="0" err="1" smtClean="0">
+              <a:rPr lang="en-US" dirty="0" err="1">
                 <a:solidFill>
                   <a:schemeClr val="dk2"/>
                 </a:solidFill>
@@ -22815,7 +22798,7 @@
               <a:t>muestra</a:t>
             </a:r>
             <a:r>
-              <a:rPr lang="en-US" i="1" dirty="0" smtClean="0">
+              <a:rPr lang="en-US" dirty="0">
                 <a:solidFill>
                   <a:schemeClr val="dk2"/>
                 </a:solidFill>
@@ -22824,7 +22807,7 @@
               <a:t> </a:t>
             </a:r>
             <a:r>
-              <a:rPr lang="en-US" i="1" dirty="0" err="1" smtClean="0">
+              <a:rPr lang="en-US" dirty="0" err="1">
                 <a:solidFill>
                   <a:schemeClr val="dk2"/>
                 </a:solidFill>
@@ -22833,7 +22816,7 @@
               <a:t>todas</a:t>
             </a:r>
             <a:r>
-              <a:rPr lang="en-US" i="1" dirty="0" smtClean="0">
+              <a:rPr lang="en-US" dirty="0">
                 <a:solidFill>
                   <a:schemeClr val="dk2"/>
                 </a:solidFill>
@@ -22842,16 +22825,16 @@
               <a:t> la </a:t>
             </a:r>
             <a:r>
-              <a:rPr lang="en-US" i="1" dirty="0" err="1" smtClean="0">
+              <a:rPr lang="en-US" dirty="0" err="1" smtClean="0">
                 <a:solidFill>
                   <a:schemeClr val="dk2"/>
                 </a:solidFill>
                 <a:latin typeface="+mn-lt"/>
               </a:rPr>
-              <a:t>imagenes</a:t>
-            </a:r>
-            <a:r>
-              <a:rPr lang="en-US" i="1" dirty="0" smtClean="0">
+              <a:t>imágenes</a:t>
+            </a:r>
+            <a:r>
+              <a:rPr lang="en-US" dirty="0" smtClean="0">
                 <a:solidFill>
                   <a:schemeClr val="dk2"/>
                 </a:solidFill>
@@ -22860,7 +22843,7 @@
               <a:t> </a:t>
             </a:r>
             <a:r>
-              <a:rPr lang="en-US" i="1" dirty="0" err="1" smtClean="0">
+              <a:rPr lang="en-US" dirty="0" err="1">
                 <a:solidFill>
                   <a:schemeClr val="dk2"/>
                 </a:solidFill>
@@ -22869,7 +22852,7 @@
               <a:t>presentes</a:t>
             </a:r>
             <a:r>
-              <a:rPr lang="en-US" i="1" dirty="0" smtClean="0">
+              <a:rPr lang="en-US" dirty="0">
                 <a:solidFill>
                   <a:schemeClr val="dk2"/>
                 </a:solidFill>
@@ -22886,7 +22869,7 @@
               <a:buFont typeface="Arial" panose="020B0604020202020204" pitchFamily="34" charset="0"/>
               <a:buChar char="•"/>
             </a:pPr>
-            <a:endParaRPr lang="es-CO" i="1" dirty="0">
+            <a:endParaRPr lang="es-CO" dirty="0">
               <a:solidFill>
                 <a:schemeClr val="dk2"/>
               </a:solidFill>
@@ -22902,7 +22885,7 @@
               <a:buChar char="•"/>
             </a:pPr>
             <a:r>
-              <a:rPr lang="es-CO" i="1" dirty="0" smtClean="0">
+              <a:rPr lang="es-CO" dirty="0">
                 <a:solidFill>
                   <a:schemeClr val="dk2"/>
                 </a:solidFill>
@@ -22911,7 +22894,7 @@
               <a:t>“</a:t>
             </a:r>
             <a:r>
-              <a:rPr lang="es-CO" i="1" dirty="0" err="1" smtClean="0">
+              <a:rPr lang="es-CO" dirty="0" err="1">
                 <a:solidFill>
                   <a:schemeClr val="dk2"/>
                 </a:solidFill>
@@ -22920,7 +22903,7 @@
               <a:t>docker</a:t>
             </a:r>
             <a:r>
-              <a:rPr lang="es-CO" i="1" dirty="0" smtClean="0">
+              <a:rPr lang="es-CO" dirty="0">
                 <a:solidFill>
                   <a:schemeClr val="dk2"/>
                 </a:solidFill>
@@ -22929,7 +22912,7 @@
               <a:t> </a:t>
             </a:r>
             <a:r>
-              <a:rPr lang="es-CO" i="1" dirty="0" err="1" smtClean="0">
+              <a:rPr lang="es-CO" dirty="0" err="1">
                 <a:solidFill>
                   <a:schemeClr val="dk2"/>
                 </a:solidFill>
@@ -22938,7 +22921,7 @@
               <a:t>rmi</a:t>
             </a:r>
             <a:r>
-              <a:rPr lang="es-CO" i="1" dirty="0" smtClean="0">
+              <a:rPr lang="es-CO" dirty="0">
                 <a:solidFill>
                   <a:schemeClr val="dk2"/>
                 </a:solidFill>
@@ -22947,7 +22930,7 @@
               <a:t> {</a:t>
             </a:r>
             <a:r>
-              <a:rPr lang="es-CO" i="1" dirty="0" err="1" smtClean="0">
+              <a:rPr lang="es-CO" dirty="0" err="1">
                 <a:solidFill>
                   <a:schemeClr val="dk2"/>
                 </a:solidFill>
@@ -22956,15 +22939,33 @@
               <a:t>image_id</a:t>
             </a:r>
             <a:r>
-              <a:rPr lang="es-CO" i="1" dirty="0" smtClean="0">
+              <a:rPr lang="es-CO" dirty="0">
                 <a:solidFill>
                   <a:schemeClr val="dk2"/>
                 </a:solidFill>
                 <a:latin typeface="+mn-lt"/>
               </a:rPr>
-              <a:t>}” remueve una imagen de la maquina.</a:t>
-            </a:r>
-            <a:endParaRPr lang="en" i="1" dirty="0">
+              <a:t>}” remueve una imagen de la </a:t>
+            </a:r>
+            <a:r>
+              <a:rPr lang="es-CO" dirty="0" smtClean="0">
+                <a:solidFill>
+                  <a:schemeClr val="dk2"/>
+                </a:solidFill>
+                <a:latin typeface="+mn-lt"/>
+              </a:rPr>
+              <a:t>máquina</a:t>
+            </a:r>
+            <a:r>
+              <a:rPr lang="es-CO" dirty="0">
+                <a:solidFill>
+                  <a:schemeClr val="dk2"/>
+                </a:solidFill>
+                <a:latin typeface="+mn-lt"/>
+              </a:rPr>
+              <a:t>.</a:t>
+            </a:r>
+            <a:endParaRPr lang="en" dirty="0">
               <a:solidFill>
                 <a:schemeClr val="dk2"/>
               </a:solidFill>
@@ -22992,6 +22993,56 @@
           </a:p>
         </p:txBody>
       </p:sp>
+      <p:sp>
+        <p:nvSpPr>
+          <p:cNvPr id="3" name="Title 2"/>
+          <p:cNvSpPr>
+            <a:spLocks noGrp="1"/>
+          </p:cNvSpPr>
+          <p:nvPr>
+            <p:ph type="title"/>
+          </p:nvPr>
+        </p:nvSpPr>
+        <p:spPr/>
+        <p:txBody>
+          <a:bodyPr/>
+          <a:lstStyle/>
+          <a:p>
+            <a:r>
+              <a:rPr lang="es-CO" dirty="0" err="1" smtClean="0"/>
+              <a:t>Docker</a:t>
+            </a:r>
+            <a:r>
+              <a:rPr lang="es-CO" dirty="0" smtClean="0"/>
+              <a:t> </a:t>
+            </a:r>
+            <a:r>
+              <a:rPr lang="es-CO" dirty="0" err="1" smtClean="0"/>
+              <a:t>Images</a:t>
+            </a:r>
+            <a:endParaRPr lang="en-US" dirty="0"/>
+          </a:p>
+        </p:txBody>
+      </p:sp>
+      <p:sp>
+        <p:nvSpPr>
+          <p:cNvPr id="4" name="Text Placeholder 3"/>
+          <p:cNvSpPr>
+            <a:spLocks noGrp="1"/>
+          </p:cNvSpPr>
+          <p:nvPr>
+            <p:ph type="body" sz="quarter" idx="11"/>
+          </p:nvPr>
+        </p:nvSpPr>
+        <p:spPr/>
+        <p:txBody>
+          <a:bodyPr/>
+          <a:lstStyle/>
+          <a:p>
+            <a:endParaRPr lang="en-US"/>
+          </a:p>
+        </p:txBody>
+      </p:sp>
     </p:spTree>
     <p:extLst>
       <p:ext uri="{BB962C8B-B14F-4D97-AF65-F5344CB8AC3E}">
@@ -23000,7 +23051,7 @@
     </p:extLst>
   </p:cSld>
   <p:clrMapOvr>
-    <a:masterClrMapping/>
+    <a:overrideClrMapping bg1="lt1" tx1="dk1" bg2="lt2" tx2="dk2" accent1="accent1" accent2="accent2" accent3="accent3" accent4="accent4" accent5="accent5" accent6="accent6" hlink="hlink" folHlink="folHlink"/>
   </p:clrMapOvr>
   <mc:AlternateContent xmlns:mc="http://schemas.openxmlformats.org/markup-compatibility/2006" xmlns:p14="http://schemas.microsoft.com/office/powerpoint/2010/main">
     <mc:Choice Requires="p14">
@@ -24932,7 +24983,25 @@
                 </a:solidFill>
                 <a:latin typeface="+mn-lt"/>
               </a:rPr>
-              <a:t>“docker ps” muestra todos los contenedores en ejecucion.</a:t>
+              <a:t>“docker ps” muestra todos los contenedores en </a:t>
+            </a:r>
+            <a:r>
+              <a:rPr lang="en" dirty="0" smtClean="0">
+                <a:solidFill>
+                  <a:schemeClr val="dk2"/>
+                </a:solidFill>
+                <a:latin typeface="+mn-lt"/>
+              </a:rPr>
+              <a:t>ejecución</a:t>
+            </a:r>
+            <a:r>
+              <a:rPr lang="en" dirty="0" smtClean="0">
+                <a:solidFill>
+                  <a:schemeClr val="dk2"/>
+                </a:solidFill>
+                <a:latin typeface="+mn-lt"/>
+              </a:rPr>
+              <a:t>.</a:t>
             </a:r>
           </a:p>
           <a:p>
@@ -26550,7 +26619,7 @@
                 </a:solidFill>
                 <a:cs typeface="Arial" pitchFamily="34" charset="0"/>
               </a:rPr>
-              <a:t>destiantion</a:t>
+              <a:t>destination</a:t>
             </a:r>
             <a:r>
               <a:rPr lang="es-CO" sz="2800" dirty="0" smtClean="0">
@@ -26559,16 +26628,7 @@
                 </a:solidFill>
                 <a:cs typeface="Arial" pitchFamily="34" charset="0"/>
               </a:rPr>
-              <a:t>” </a:t>
-            </a:r>
-            <a:r>
-              <a:rPr lang="es-CO" sz="2800" dirty="0" smtClean="0">
-                <a:solidFill>
-                  <a:schemeClr val="dk2"/>
-                </a:solidFill>
-                <a:cs typeface="Arial" pitchFamily="34" charset="0"/>
-              </a:rPr>
-              <a:t>copia un archivo al/del contenedor.</a:t>
+              <a:t>” copia un archivo al/del contenedor.</a:t>
             </a:r>
           </a:p>
           <a:p>
@@ -26942,7 +27002,7 @@
           <a:bodyPr/>
           <a:lstStyle/>
           <a:p>
-            <a:endParaRPr lang="en-US"/>
+            <a:endParaRPr lang="en-US" dirty="0"/>
           </a:p>
         </p:txBody>
       </p:sp>
@@ -28665,12 +28725,6 @@
               </a:rPr>
               <a:t>Usando el comando “docker-compose up” se puede inicializar el compose, el cual crea todos los recursos especificados en el archivo.</a:t>
             </a:r>
-            <a:endParaRPr lang="en" dirty="0" smtClean="0">
-              <a:solidFill>
-                <a:schemeClr val="dk2"/>
-              </a:solidFill>
-              <a:latin typeface="+mn-lt"/>
-            </a:endParaRPr>
           </a:p>
           <a:p>
             <a:pPr algn="just">
@@ -29096,7 +29150,25 @@
                 </a:solidFill>
                 <a:latin typeface="+mn-lt"/>
               </a:rPr>
-              <a:t>Usando el comando “docker-compose pause” se puede pausar los contenedores, con unpause se puede resumir.</a:t>
+              <a:t>Usando el comando “docker-compose pause” se puede pausar los </a:t>
+            </a:r>
+            <a:r>
+              <a:rPr lang="en" dirty="0" smtClean="0">
+                <a:solidFill>
+                  <a:schemeClr val="dk2"/>
+                </a:solidFill>
+                <a:latin typeface="+mn-lt"/>
+              </a:rPr>
+              <a:t>contenedores</a:t>
+            </a:r>
+            <a:r>
+              <a:rPr lang="en" dirty="0">
+                <a:solidFill>
+                  <a:schemeClr val="dk2"/>
+                </a:solidFill>
+                <a:latin typeface="+mn-lt"/>
+              </a:rPr>
+              <a:t>.</a:t>
             </a:r>
             <a:endParaRPr lang="en" dirty="0" smtClean="0">
               <a:solidFill>
@@ -29134,6 +29206,69 @@
                   <a:schemeClr val="dk2"/>
                 </a:solidFill>
               </a:rPr>
+              <a:t>Usando el comando “docker-compose </a:t>
+            </a:r>
+            <a:r>
+              <a:rPr lang="en" dirty="0" smtClean="0">
+                <a:solidFill>
+                  <a:schemeClr val="dk2"/>
+                </a:solidFill>
+              </a:rPr>
+              <a:t>unpause</a:t>
+            </a:r>
+            <a:r>
+              <a:rPr lang="en" dirty="0">
+                <a:solidFill>
+                  <a:schemeClr val="dk2"/>
+                </a:solidFill>
+              </a:rPr>
+              <a:t>” se puede </a:t>
+            </a:r>
+            <a:r>
+              <a:rPr lang="en" dirty="0" smtClean="0">
+                <a:solidFill>
+                  <a:schemeClr val="dk2"/>
+                </a:solidFill>
+              </a:rPr>
+              <a:t>resumir </a:t>
+            </a:r>
+            <a:r>
+              <a:rPr lang="en" dirty="0">
+                <a:solidFill>
+                  <a:schemeClr val="dk2"/>
+                </a:solidFill>
+              </a:rPr>
+              <a:t>los contenedores.</a:t>
+            </a:r>
+          </a:p>
+          <a:p>
+            <a:pPr marL="0" indent="0" algn="just">
+              <a:spcBef>
+                <a:spcPts val="0"/>
+              </a:spcBef>
+              <a:buNone/>
+            </a:pPr>
+            <a:endParaRPr lang="en" dirty="0">
+              <a:solidFill>
+                <a:schemeClr val="dk2"/>
+              </a:solidFill>
+              <a:latin typeface="+mn-lt"/>
+            </a:endParaRPr>
+          </a:p>
+          <a:p>
+            <a:pPr algn="just">
+              <a:spcBef>
+                <a:spcPts val="0"/>
+              </a:spcBef>
+              <a:buFont typeface="Arial" panose="020B0604020202020204" pitchFamily="34" charset="0"/>
+              <a:buChar char="•"/>
+            </a:pPr>
+            <a:r>
+              <a:rPr lang="en" dirty="0">
+                <a:solidFill>
+                  <a:schemeClr val="dk2"/>
+                </a:solidFill>
+              </a:rPr>
               <a:t>Usando el comando “</a:t>
             </a:r>
             <a:r>
@@ -29158,7 +29293,15 @@
                   <a:schemeClr val="dk2"/>
                 </a:solidFill>
               </a:rPr>
-              <a:t>reinician cualquier contenedor que no esta funcionando.</a:t>
+              <a:t>reinicia cualquier </a:t>
+            </a:r>
+            <a:r>
+              <a:rPr lang="en" dirty="0" smtClean="0">
+                <a:solidFill>
+                  <a:schemeClr val="dk2"/>
+                </a:solidFill>
+              </a:rPr>
+              <a:t>contenedor que no esta funcionando.</a:t>
             </a:r>
             <a:endParaRPr lang="en" dirty="0">
               <a:solidFill>
@@ -29532,7 +29675,7 @@
           <p:nvPr>
             <p:extLst>
               <p:ext uri="{D42A27DB-BD31-4B8C-83A1-F6EECF244321}">
-                <p14:modId xmlns:p14="http://schemas.microsoft.com/office/powerpoint/2010/main" val="2780139726"/>
+                <p14:modId xmlns:p14="http://schemas.microsoft.com/office/powerpoint/2010/main" val="1980733815"/>
               </p:ext>
             </p:extLst>
           </p:nvPr>
@@ -29763,7 +29906,7 @@
                     <a:p>
                       <a:r>
                         <a:rPr lang="es-CO" dirty="0" err="1" smtClean="0"/>
-                        <a:t>Dependecie</a:t>
+                        <a:t>Dependecies</a:t>
                       </a:r>
                       <a:r>
                         <a:rPr lang="es-CO" dirty="0" smtClean="0"/>
@@ -29950,7 +30093,7 @@
         <p:spPr>
           <a:xfrm>
             <a:off x="539552" y="1052736"/>
-            <a:ext cx="8363938" cy="3367076"/>
+            <a:ext cx="8363938" cy="4653582"/>
           </a:xfrm>
         </p:spPr>
         <p:txBody>
@@ -29962,8 +30105,18 @@
             </a:pPr>
             <a:r>
               <a:rPr lang="es-CO" dirty="0" smtClean="0"/>
-              <a:t>Ejercicio:</a:t>
-            </a:r>
+              <a:t>Ejercicio</a:t>
+            </a:r>
+            <a:r>
+              <a:rPr lang="es-CO" dirty="0" smtClean="0"/>
+              <a:t>:</a:t>
+            </a:r>
+          </a:p>
+          <a:p>
+            <a:pPr marL="0" indent="0">
+              <a:buNone/>
+            </a:pPr>
+            <a:endParaRPr lang="es-CO" dirty="0" smtClean="0"/>
           </a:p>
           <a:p>
             <a:pPr lvl="1">
@@ -29972,11 +30125,11 @@
             </a:pPr>
             <a:r>
               <a:rPr lang="es-CO" dirty="0" smtClean="0"/>
-              <a:t>Agregar un publicador mas al </a:t>
+              <a:t>	Navegar a </a:t>
             </a:r>
             <a:r>
               <a:rPr lang="es-CO" dirty="0" err="1" smtClean="0"/>
-              <a:t>compose</a:t>
+              <a:t>full_compose</a:t>
             </a:r>
             <a:endParaRPr lang="es-CO" dirty="0" smtClean="0"/>
           </a:p>
@@ -29987,7 +30140,53 @@
             </a:pPr>
             <a:r>
               <a:rPr lang="es-CO" dirty="0" smtClean="0"/>
-              <a:t>Agregar un consumidor mas al </a:t>
+              <a:t>Agregar un publicador </a:t>
+            </a:r>
+            <a:r>
+              <a:rPr lang="es-CO" dirty="0" smtClean="0"/>
+              <a:t>más </a:t>
+            </a:r>
+            <a:r>
+              <a:rPr lang="es-CO" dirty="0" smtClean="0"/>
+              <a:t>al </a:t>
+            </a:r>
+            <a:r>
+              <a:rPr lang="es-CO" dirty="0" err="1" smtClean="0"/>
+              <a:t>compose</a:t>
+            </a:r>
+            <a:endParaRPr lang="es-CO" dirty="0" smtClean="0"/>
+          </a:p>
+          <a:p>
+            <a:pPr lvl="1">
+              <a:buFont typeface="Arial" panose="020B0604020202020204" pitchFamily="34" charset="0"/>
+              <a:buChar char="•"/>
+            </a:pPr>
+            <a:r>
+              <a:rPr lang="es-CO" dirty="0" smtClean="0"/>
+              <a:t>Agregar un consumidor </a:t>
+            </a:r>
+            <a:r>
+              <a:rPr lang="es-CO" dirty="0" smtClean="0"/>
+              <a:t>más </a:t>
+            </a:r>
+            <a:r>
+              <a:rPr lang="es-CO" dirty="0" smtClean="0"/>
+              <a:t>al </a:t>
+            </a:r>
+            <a:r>
+              <a:rPr lang="es-CO" dirty="0" err="1" smtClean="0"/>
+              <a:t>compose</a:t>
+            </a:r>
+            <a:endParaRPr lang="es-CO" dirty="0" smtClean="0"/>
+          </a:p>
+          <a:p>
+            <a:pPr lvl="1">
+              <a:buFont typeface="Arial" panose="020B0604020202020204" pitchFamily="34" charset="0"/>
+              <a:buChar char="•"/>
+            </a:pPr>
+            <a:r>
+              <a:rPr lang="es-CO" dirty="0" smtClean="0"/>
+              <a:t>Iniciar el </a:t>
             </a:r>
             <a:r>
               <a:rPr lang="es-CO" dirty="0" err="1" smtClean="0"/>
@@ -31273,6 +31472,10 @@
           <a:bodyPr/>
           <a:lstStyle/>
           <a:p>
+            <a:pPr>
+              <a:buFont typeface="Arial" panose="020B0604020202020204" pitchFamily="34" charset="0"/>
+              <a:buChar char="•"/>
+            </a:pPr>
             <a:r>
               <a:rPr lang="en-US" dirty="0">
                 <a:hlinkClick r:id="rId2"/>
@@ -31291,10 +31494,29 @@
             <a:endParaRPr lang="es-CO" dirty="0"/>
           </a:p>
           <a:p>
-            <a:r>
-              <a:rPr lang="en-US" dirty="0"/>
-              <a:t>https://docs.docker.com/</a:t>
-            </a:r>
+            <a:pPr>
+              <a:buFont typeface="Arial" panose="020B0604020202020204" pitchFamily="34" charset="0"/>
+              <a:buChar char="•"/>
+            </a:pPr>
+            <a:r>
+              <a:rPr lang="en-US" dirty="0" smtClean="0">
+                <a:hlinkClick r:id="rId3"/>
+              </a:rPr>
+              <a:t>https</a:t>
+            </a:r>
+            <a:r>
+              <a:rPr lang="en-US" dirty="0">
+                <a:hlinkClick r:id="rId3"/>
+              </a:rPr>
+              <a:t>://docs.docker.com</a:t>
+            </a:r>
+            <a:r>
+              <a:rPr lang="en-US" dirty="0" smtClean="0">
+                <a:hlinkClick r:id="rId3"/>
+              </a:rPr>
+              <a:t>/</a:t>
+            </a:r>
+            <a:endParaRPr lang="en-US" dirty="0"/>
           </a:p>
         </p:txBody>
       </p:sp>
@@ -35798,4 +36020,47 @@
     </a:folHlink>
   </a:clrScheme>
 </a:themeOverride>
+</file>
+
+<file path=ppt/theme/themeOverride9.xml><?xml version="1.0" encoding="utf-8"?>
+<a:themeOverride xmlns:a="http://schemas.openxmlformats.org/drawingml/2006/main">
+  <a:clrScheme name="GDC12">
+    <a:dk1>
+      <a:srgbClr val="292929"/>
+    </a:dk1>
+    <a:lt1>
+      <a:srgbClr val="FFFFFF"/>
+    </a:lt1>
+    <a:dk2>
+      <a:srgbClr val="4D4D4F"/>
+    </a:dk2>
+    <a:lt2>
+      <a:srgbClr val="DDDDDD"/>
+    </a:lt2>
+    <a:accent1>
+      <a:srgbClr val="0054A6"/>
+    </a:accent1>
+    <a:accent2>
+      <a:srgbClr val="0072BC"/>
+    </a:accent2>
+    <a:accent3>
+      <a:srgbClr val="004185"/>
+    </a:accent3>
+    <a:accent4>
+      <a:srgbClr val="ADAFB2"/>
+    </a:accent4>
+    <a:accent5>
+      <a:srgbClr val="BAD80A"/>
+    </a:accent5>
+    <a:accent6>
+      <a:srgbClr val="FF8C00"/>
+    </a:accent6>
+    <a:hlink>
+      <a:srgbClr val="55D455"/>
+    </a:hlink>
+    <a:folHlink>
+      <a:srgbClr val="DDB900"/>
+    </a:folHlink>
+  </a:clrScheme>
+</a:themeOverride>
 </file>
</xml_diff>